<commit_message>
Made final changes to my shii
</commit_message>
<xml_diff>
--- a/Ajiboye Oluwaferanmi Post Data.pptx
+++ b/Ajiboye Oluwaferanmi Post Data.pptx
@@ -5,7 +5,7 @@
     <p:sldMasterId id="2147483658" r:id="rId1"/>
   </p:sldMasterIdLst>
   <p:notesMasterIdLst>
-    <p:notesMasterId r:id="rId28"/>
+    <p:notesMasterId r:id="rId29"/>
   </p:notesMasterIdLst>
   <p:sldIdLst>
     <p:sldId id="256" r:id="rId2"/>
@@ -23,48 +23,49 @@
     <p:sldId id="301" r:id="rId14"/>
     <p:sldId id="306" r:id="rId15"/>
     <p:sldId id="305" r:id="rId16"/>
-    <p:sldId id="307" r:id="rId17"/>
-    <p:sldId id="308" r:id="rId18"/>
-    <p:sldId id="302" r:id="rId19"/>
-    <p:sldId id="304" r:id="rId20"/>
-    <p:sldId id="309" r:id="rId21"/>
-    <p:sldId id="312" r:id="rId22"/>
-    <p:sldId id="268" r:id="rId23"/>
-    <p:sldId id="298" r:id="rId24"/>
-    <p:sldId id="310" r:id="rId25"/>
-    <p:sldId id="311" r:id="rId26"/>
-    <p:sldId id="267" r:id="rId27"/>
+    <p:sldId id="313" r:id="rId17"/>
+    <p:sldId id="307" r:id="rId18"/>
+    <p:sldId id="308" r:id="rId19"/>
+    <p:sldId id="302" r:id="rId20"/>
+    <p:sldId id="304" r:id="rId21"/>
+    <p:sldId id="309" r:id="rId22"/>
+    <p:sldId id="312" r:id="rId23"/>
+    <p:sldId id="268" r:id="rId24"/>
+    <p:sldId id="298" r:id="rId25"/>
+    <p:sldId id="310" r:id="rId26"/>
+    <p:sldId id="311" r:id="rId27"/>
+    <p:sldId id="267" r:id="rId28"/>
   </p:sldIdLst>
   <p:sldSz cx="9144000" cy="5143500" type="screen16x9"/>
   <p:notesSz cx="6858000" cy="9144000"/>
   <p:embeddedFontLst>
     <p:embeddedFont>
-      <p:font typeface="Segoe UI" panose="020B0502040204020203" pitchFamily="34" charset="0"/>
-      <p:regular r:id="rId29"/>
-      <p:bold r:id="rId30"/>
-      <p:italic r:id="rId31"/>
-      <p:boldItalic r:id="rId32"/>
+      <p:font typeface="Roboto Slab" panose="020B0604020202020204" charset="0"/>
+      <p:regular r:id="rId30"/>
+      <p:bold r:id="rId31"/>
     </p:embeddedFont>
     <p:embeddedFont>
-      <p:font typeface="Roboto Slab" panose="020B0604020202020204" charset="0"/>
-      <p:regular r:id="rId33"/>
-      <p:bold r:id="rId34"/>
+      <p:font typeface="Tahoma" panose="020B0604030504040204" pitchFamily="34" charset="0"/>
+      <p:regular r:id="rId32"/>
+      <p:bold r:id="rId33"/>
     </p:embeddedFont>
     <p:embeddedFont>
       <p:font typeface="Source Sans Pro" panose="020B0604020202020204" charset="0"/>
-      <p:regular r:id="rId35"/>
-      <p:bold r:id="rId36"/>
-      <p:italic r:id="rId37"/>
-      <p:boldItalic r:id="rId38"/>
+      <p:regular r:id="rId34"/>
+      <p:bold r:id="rId35"/>
+      <p:italic r:id="rId36"/>
+      <p:boldItalic r:id="rId37"/>
+    </p:embeddedFont>
+    <p:embeddedFont>
+      <p:font typeface="Segoe UI" panose="020B0502040204020203" pitchFamily="34" charset="0"/>
+      <p:regular r:id="rId38"/>
+      <p:bold r:id="rId39"/>
+      <p:italic r:id="rId40"/>
+      <p:boldItalic r:id="rId41"/>
     </p:embeddedFont>
     <p:embeddedFont>
       <p:font typeface="Jokerman" panose="04090605060D06020702" pitchFamily="82" charset="0"/>
-      <p:regular r:id="rId39"/>
-    </p:embeddedFont>
-    <p:embeddedFont>
-      <p:font typeface="Tahoma" panose="020B0604030504040204" pitchFamily="34" charset="0"/>
-      <p:regular r:id="rId40"/>
-      <p:bold r:id="rId41"/>
+      <p:regular r:id="rId42"/>
     </p:embeddedFont>
   </p:embeddedFontLst>
   <p:defaultTextStyle>
@@ -1612,7 +1613,7 @@
     </p:spTree>
     <p:extLst>
       <p:ext uri="{BB962C8B-B14F-4D97-AF65-F5344CB8AC3E}">
-        <p14:creationId xmlns:p14="http://schemas.microsoft.com/office/powerpoint/2010/main" val="3175257054"/>
+        <p14:creationId xmlns:p14="http://schemas.microsoft.com/office/powerpoint/2010/main" val="2842794179"/>
       </p:ext>
     </p:extLst>
   </p:cSld>
@@ -1721,7 +1722,7 @@
     </p:spTree>
     <p:extLst>
       <p:ext uri="{BB962C8B-B14F-4D97-AF65-F5344CB8AC3E}">
-        <p14:creationId xmlns:p14="http://schemas.microsoft.com/office/powerpoint/2010/main" val="26709171"/>
+        <p14:creationId xmlns:p14="http://schemas.microsoft.com/office/powerpoint/2010/main" val="3175257054"/>
       </p:ext>
     </p:extLst>
   </p:cSld>
@@ -1830,7 +1831,7 @@
     </p:spTree>
     <p:extLst>
       <p:ext uri="{BB962C8B-B14F-4D97-AF65-F5344CB8AC3E}">
-        <p14:creationId xmlns:p14="http://schemas.microsoft.com/office/powerpoint/2010/main" val="38850608"/>
+        <p14:creationId xmlns:p14="http://schemas.microsoft.com/office/powerpoint/2010/main" val="26709171"/>
       </p:ext>
     </p:extLst>
   </p:cSld>
@@ -1939,7 +1940,7 @@
     </p:spTree>
     <p:extLst>
       <p:ext uri="{BB962C8B-B14F-4D97-AF65-F5344CB8AC3E}">
-        <p14:creationId xmlns:p14="http://schemas.microsoft.com/office/powerpoint/2010/main" val="4153633471"/>
+        <p14:creationId xmlns:p14="http://schemas.microsoft.com/office/powerpoint/2010/main" val="38850608"/>
       </p:ext>
     </p:extLst>
   </p:cSld>
@@ -2157,7 +2158,7 @@
     </p:spTree>
     <p:extLst>
       <p:ext uri="{BB962C8B-B14F-4D97-AF65-F5344CB8AC3E}">
-        <p14:creationId xmlns:p14="http://schemas.microsoft.com/office/powerpoint/2010/main" val="3478978741"/>
+        <p14:creationId xmlns:p14="http://schemas.microsoft.com/office/powerpoint/2010/main" val="4153633471"/>
       </p:ext>
     </p:extLst>
   </p:cSld>
@@ -2266,7 +2267,7 @@
     </p:spTree>
     <p:extLst>
       <p:ext uri="{BB962C8B-B14F-4D97-AF65-F5344CB8AC3E}">
-        <p14:creationId xmlns:p14="http://schemas.microsoft.com/office/powerpoint/2010/main" val="630783334"/>
+        <p14:creationId xmlns:p14="http://schemas.microsoft.com/office/powerpoint/2010/main" val="3478978741"/>
       </p:ext>
     </p:extLst>
   </p:cSld>
@@ -2281,7 +2282,7 @@
   <p:cSld>
     <p:spTree>
       <p:nvGrpSpPr>
-        <p:cNvPr id="1" name="Shape 172"/>
+        <p:cNvPr id="1" name="Shape 136"/>
         <p:cNvGrpSpPr/>
         <p:nvPr/>
       </p:nvGrpSpPr>
@@ -2295,7 +2296,7 @@
       </p:grpSpPr>
       <p:sp>
         <p:nvSpPr>
-          <p:cNvPr id="173" name="Google Shape;173;gfda085fb6_582_0:notes"/>
+          <p:cNvPr id="137" name="Google Shape;137;g35f391192_045:notes"/>
           <p:cNvSpPr>
             <a:spLocks noGrp="1" noRot="1" noChangeAspect="1"/>
           </p:cNvSpPr>
@@ -2336,7 +2337,7 @@
       </p:sp>
       <p:sp>
         <p:nvSpPr>
-          <p:cNvPr id="174" name="Google Shape;174;gfda085fb6_582_0:notes"/>
+          <p:cNvPr id="138" name="Google Shape;138;g35f391192_045:notes"/>
           <p:cNvSpPr txBox="1">
             <a:spLocks noGrp="1"/>
           </p:cNvSpPr>
@@ -2375,7 +2376,7 @@
     </p:spTree>
     <p:extLst>
       <p:ext uri="{BB962C8B-B14F-4D97-AF65-F5344CB8AC3E}">
-        <p14:creationId xmlns:p14="http://schemas.microsoft.com/office/powerpoint/2010/main" val="933292952"/>
+        <p14:creationId xmlns:p14="http://schemas.microsoft.com/office/powerpoint/2010/main" val="630783334"/>
       </p:ext>
     </p:extLst>
   </p:cSld>
@@ -2484,7 +2485,7 @@
     </p:spTree>
     <p:extLst>
       <p:ext uri="{BB962C8B-B14F-4D97-AF65-F5344CB8AC3E}">
-        <p14:creationId xmlns:p14="http://schemas.microsoft.com/office/powerpoint/2010/main" val="1430042361"/>
+        <p14:creationId xmlns:p14="http://schemas.microsoft.com/office/powerpoint/2010/main" val="933292952"/>
       </p:ext>
     </p:extLst>
   </p:cSld>
@@ -2593,7 +2594,7 @@
     </p:spTree>
     <p:extLst>
       <p:ext uri="{BB962C8B-B14F-4D97-AF65-F5344CB8AC3E}">
-        <p14:creationId xmlns:p14="http://schemas.microsoft.com/office/powerpoint/2010/main" val="624623741"/>
+        <p14:creationId xmlns:p14="http://schemas.microsoft.com/office/powerpoint/2010/main" val="1430042361"/>
       </p:ext>
     </p:extLst>
   </p:cSld>
@@ -2702,6 +2703,115 @@
     </p:spTree>
     <p:extLst>
       <p:ext uri="{BB962C8B-B14F-4D97-AF65-F5344CB8AC3E}">
+        <p14:creationId xmlns:p14="http://schemas.microsoft.com/office/powerpoint/2010/main" val="624623741"/>
+      </p:ext>
+    </p:extLst>
+  </p:cSld>
+  <p:clrMapOvr>
+    <a:masterClrMapping/>
+  </p:clrMapOvr>
+</p:notes>
+</file>
+
+<file path=ppt/notesSlides/notesSlide26.xml><?xml version="1.0" encoding="utf-8"?>
+<p:notes xmlns:a="http://schemas.openxmlformats.org/drawingml/2006/main" xmlns:r="http://schemas.openxmlformats.org/officeDocument/2006/relationships" xmlns:p="http://schemas.openxmlformats.org/presentationml/2006/main" showMasterSp="0" showMasterPhAnim="0">
+  <p:cSld>
+    <p:spTree>
+      <p:nvGrpSpPr>
+        <p:cNvPr id="1" name="Shape 172"/>
+        <p:cNvGrpSpPr/>
+        <p:nvPr/>
+      </p:nvGrpSpPr>
+      <p:grpSpPr>
+        <a:xfrm>
+          <a:off x="0" y="0"/>
+          <a:ext cx="0" cy="0"/>
+          <a:chOff x="0" y="0"/>
+          <a:chExt cx="0" cy="0"/>
+        </a:xfrm>
+      </p:grpSpPr>
+      <p:sp>
+        <p:nvSpPr>
+          <p:cNvPr id="173" name="Google Shape;173;gfda085fb6_582_0:notes"/>
+          <p:cNvSpPr>
+            <a:spLocks noGrp="1" noRot="1" noChangeAspect="1"/>
+          </p:cNvSpPr>
+          <p:nvPr>
+            <p:ph type="sldImg" idx="2"/>
+          </p:nvPr>
+        </p:nvSpPr>
+        <p:spPr>
+          <a:xfrm>
+            <a:off x="381000" y="685800"/>
+            <a:ext cx="6096000" cy="3429000"/>
+          </a:xfrm>
+          <a:custGeom>
+            <a:avLst/>
+            <a:gdLst/>
+            <a:ahLst/>
+            <a:cxnLst/>
+            <a:rect l="l" t="t" r="r" b="b"/>
+            <a:pathLst>
+              <a:path w="120000" h="120000" extrusionOk="0">
+                <a:moveTo>
+                  <a:pt x="0" y="0"/>
+                </a:moveTo>
+                <a:lnTo>
+                  <a:pt x="120000" y="0"/>
+                </a:lnTo>
+                <a:lnTo>
+                  <a:pt x="120000" y="120000"/>
+                </a:lnTo>
+                <a:lnTo>
+                  <a:pt x="0" y="120000"/>
+                </a:lnTo>
+                <a:close/>
+              </a:path>
+            </a:pathLst>
+          </a:custGeom>
+        </p:spPr>
+      </p:sp>
+      <p:sp>
+        <p:nvSpPr>
+          <p:cNvPr id="174" name="Google Shape;174;gfda085fb6_582_0:notes"/>
+          <p:cNvSpPr txBox="1">
+            <a:spLocks noGrp="1"/>
+          </p:cNvSpPr>
+          <p:nvPr>
+            <p:ph type="body" idx="1"/>
+          </p:nvPr>
+        </p:nvSpPr>
+        <p:spPr>
+          <a:xfrm>
+            <a:off x="685800" y="4343400"/>
+            <a:ext cx="5486400" cy="4114800"/>
+          </a:xfrm>
+          <a:prstGeom prst="rect">
+            <a:avLst/>
+          </a:prstGeom>
+        </p:spPr>
+        <p:txBody>
+          <a:bodyPr spcFirstLastPara="1" wrap="square" lIns="91425" tIns="91425" rIns="91425" bIns="91425" anchor="t" anchorCtr="0">
+            <a:noAutofit/>
+          </a:bodyPr>
+          <a:lstStyle/>
+          <a:p>
+            <a:pPr marL="0" lvl="0" indent="0" algn="l" rtl="0">
+              <a:spcBef>
+                <a:spcPts val="0"/>
+              </a:spcBef>
+              <a:spcAft>
+                <a:spcPts val="0"/>
+              </a:spcAft>
+              <a:buNone/>
+            </a:pPr>
+            <a:endParaRPr dirty="0"/>
+          </a:p>
+        </p:txBody>
+      </p:sp>
+    </p:spTree>
+    <p:extLst>
+      <p:ext uri="{BB962C8B-B14F-4D97-AF65-F5344CB8AC3E}">
         <p14:creationId xmlns:p14="http://schemas.microsoft.com/office/powerpoint/2010/main" val="3740095648"/>
       </p:ext>
     </p:extLst>
@@ -2712,7 +2822,7 @@
 </p:notes>
 </file>
 
-<file path=ppt/notesSlides/notesSlide26.xml><?xml version="1.0" encoding="utf-8"?>
+<file path=ppt/notesSlides/notesSlide27.xml><?xml version="1.0" encoding="utf-8"?>
 <p:notes xmlns:a="http://schemas.openxmlformats.org/drawingml/2006/main" xmlns:r="http://schemas.openxmlformats.org/officeDocument/2006/relationships" xmlns:p="http://schemas.openxmlformats.org/presentationml/2006/main" showMasterSp="0" showMasterPhAnim="0">
   <p:cSld>
     <p:spTree>
@@ -7923,7 +8033,15 @@
             <a:pPr algn="ctr"/>
             <a:r>
               <a:rPr lang="en-US" dirty="0" smtClean="0"/>
-              <a:t>Test and Evaluate models created to verify accuracy</a:t>
+              <a:t>Test and Evaluate </a:t>
+            </a:r>
+            <a:r>
+              <a:rPr lang="en-US" dirty="0" smtClean="0"/>
+              <a:t>model </a:t>
+            </a:r>
+            <a:r>
+              <a:rPr lang="en-US" dirty="0" smtClean="0"/>
+              <a:t>created to verify accuracy</a:t>
             </a:r>
             <a:endParaRPr lang="en-US" dirty="0"/>
           </a:p>
@@ -7965,7 +8083,7 @@
             <a:pPr algn="ctr"/>
             <a:r>
               <a:rPr lang="en-US" dirty="0" smtClean="0"/>
-              <a:t>Receive symptoms from user and input into model</a:t>
+              <a:t>Receive data from user and input into model</a:t>
             </a:r>
             <a:endParaRPr lang="en-US" dirty="0"/>
           </a:p>
@@ -8049,7 +8167,15 @@
             <a:pPr algn="ctr"/>
             <a:r>
               <a:rPr lang="en-US" dirty="0"/>
-              <a:t>Train &amp; Build Models in with ML5JS using dataset</a:t>
+              <a:t>Train &amp; Build </a:t>
+            </a:r>
+            <a:r>
+              <a:rPr lang="en-US" dirty="0" smtClean="0"/>
+              <a:t>Model </a:t>
+            </a:r>
+            <a:r>
+              <a:rPr lang="en-US" dirty="0"/>
+              <a:t>in with ML5JS using dataset</a:t>
             </a:r>
           </a:p>
         </p:txBody>
@@ -8347,8 +8473,8 @@
         </p:blipFill>
         <p:spPr>
           <a:xfrm>
-            <a:off x="3507992" y="-196849"/>
-            <a:ext cx="4013966" cy="5143500"/>
+            <a:off x="3507992" y="-279977"/>
+            <a:ext cx="4305972" cy="5517677"/>
           </a:xfrm>
           <a:prstGeom prst="rect">
             <a:avLst/>
@@ -9749,7 +9875,7 @@
         </p:blipFill>
         <p:spPr>
           <a:xfrm>
-            <a:off x="1752205" y="1400011"/>
+            <a:off x="228552" y="2944469"/>
             <a:ext cx="5639587" cy="781159"/>
           </a:xfrm>
           <a:prstGeom prst="rect">
@@ -9767,8 +9893,8 @@
         </p:nvSpPr>
         <p:spPr>
           <a:xfrm>
-            <a:off x="1859925" y="778092"/>
-            <a:ext cx="5424148" cy="501505"/>
+            <a:off x="228552" y="763809"/>
+            <a:ext cx="3657648" cy="501505"/>
           </a:xfrm>
           <a:prstGeom prst="rect">
             <a:avLst/>
@@ -10030,12 +10156,11 @@
             </a:lvl9pPr>
           </a:lstStyle>
           <a:p>
-            <a:pPr algn="ctr"/>
             <a:r>
-              <a:rPr lang="en-US" dirty="0" smtClean="0"/>
-              <a:t>Mathematical Model of a Neural Network</a:t>
+              <a:rPr lang="en-US" sz="1800" dirty="0" smtClean="0"/>
+              <a:t>Mathematical Model of an ANN</a:t>
             </a:r>
-            <a:endParaRPr lang="en-US" dirty="0"/>
+            <a:endParaRPr lang="en-US" sz="1800" dirty="0"/>
           </a:p>
         </p:txBody>
       </p:sp>
@@ -10061,7 +10186,7 @@
         </p:blipFill>
         <p:spPr>
           <a:xfrm>
-            <a:off x="3295469" y="3190415"/>
+            <a:off x="395626" y="4184961"/>
             <a:ext cx="2553056" cy="885949"/>
           </a:xfrm>
           <a:prstGeom prst="rect">
@@ -10091,8 +10216,38 @@
         </p:blipFill>
         <p:spPr>
           <a:xfrm>
-            <a:off x="3805128" y="2409529"/>
+            <a:off x="523637" y="3725628"/>
             <a:ext cx="1533739" cy="552527"/>
+          </a:xfrm>
+          <a:prstGeom prst="rect">
+            <a:avLst/>
+          </a:prstGeom>
+        </p:spPr>
+      </p:pic>
+      <p:pic>
+        <p:nvPicPr>
+          <p:cNvPr id="6" name="Picture 5"/>
+          <p:cNvPicPr>
+            <a:picLocks noChangeAspect="1"/>
+          </p:cNvPicPr>
+          <p:nvPr/>
+        </p:nvPicPr>
+        <p:blipFill>
+          <a:blip r:embed="rId6">
+            <a:extLst>
+              <a:ext uri="{28A0092B-C50C-407E-A947-70E740481C1C}">
+                <a14:useLocalDpi xmlns:a14="http://schemas.microsoft.com/office/drawing/2010/main" val="0"/>
+              </a:ext>
+            </a:extLst>
+          </a:blip>
+          <a:stretch>
+            <a:fillRect/>
+          </a:stretch>
+        </p:blipFill>
+        <p:spPr>
+          <a:xfrm>
+            <a:off x="4013360" y="501828"/>
+            <a:ext cx="4391025" cy="2362200"/>
           </a:xfrm>
           <a:prstGeom prst="rect">
             <a:avLst/>
@@ -10552,11 +10707,7 @@
             <a:pPr algn="ctr"/>
             <a:r>
               <a:rPr lang="en-US" dirty="0" smtClean="0"/>
-              <a:t>Neural </a:t>
-            </a:r>
-            <a:r>
-              <a:rPr lang="en-US" dirty="0" smtClean="0"/>
-              <a:t>Network</a:t>
+              <a:t>Neural Network</a:t>
             </a:r>
             <a:endParaRPr lang="en-US" dirty="0"/>
           </a:p>
@@ -10572,11 +10723,11 @@
   <p:clrMapOvr>
     <a:masterClrMapping/>
   </p:clrMapOvr>
-  <mc:AlternateContent xmlns:mc="http://schemas.openxmlformats.org/markup-compatibility/2006">
-    <mc:Choice xmlns:p14="http://schemas.microsoft.com/office/powerpoint/2010/main" Requires="p14">
+  <mc:AlternateContent xmlns:mc="http://schemas.openxmlformats.org/markup-compatibility/2006" xmlns:p14="http://schemas.microsoft.com/office/powerpoint/2010/main">
+    <mc:Choice Requires="p14">
       <p:transition p14:dur="0"/>
     </mc:Choice>
-    <mc:Fallback>
+    <mc:Fallback xmlns="">
       <p:transition/>
     </mc:Fallback>
   </mc:AlternateContent>
@@ -11282,11 +11433,11 @@
   <p:clrMapOvr>
     <a:masterClrMapping/>
   </p:clrMapOvr>
-  <mc:AlternateContent xmlns:mc="http://schemas.openxmlformats.org/markup-compatibility/2006">
-    <mc:Choice xmlns:p14="http://schemas.microsoft.com/office/powerpoint/2010/main" Requires="p14">
+  <mc:AlternateContent xmlns:mc="http://schemas.openxmlformats.org/markup-compatibility/2006" xmlns:p14="http://schemas.microsoft.com/office/powerpoint/2010/main">
+    <mc:Choice Requires="p14">
       <p:transition p14:dur="0"/>
     </mc:Choice>
-    <mc:Fallback>
+    <mc:Fallback xmlns="">
       <p:transition/>
     </mc:Fallback>
   </mc:AlternateContent>
@@ -11328,10 +11479,6 @@
           </p:nvPr>
         </p:nvSpPr>
         <p:spPr>
-          <a:xfrm>
-            <a:off x="218981" y="142896"/>
-            <a:ext cx="7571700" cy="501505"/>
-          </a:xfrm>
           <a:prstGeom prst="rect">
             <a:avLst/>
           </a:prstGeom>
@@ -11347,6 +11494,70 @@
               <a:t>IMPLEMENTATION</a:t>
             </a:r>
             <a:endParaRPr sz="2400" dirty="0"/>
+          </a:p>
+        </p:txBody>
+      </p:sp>
+      <p:sp>
+        <p:nvSpPr>
+          <p:cNvPr id="3" name="Text Placeholder 2"/>
+          <p:cNvSpPr>
+            <a:spLocks noGrp="1"/>
+          </p:cNvSpPr>
+          <p:nvPr>
+            <p:ph type="body" idx="1"/>
+          </p:nvPr>
+        </p:nvSpPr>
+        <p:spPr/>
+        <p:txBody>
+          <a:bodyPr/>
+          <a:lstStyle/>
+          <a:p>
+            <a:r>
+              <a:rPr lang="en-GB" sz="1800" dirty="0" smtClean="0"/>
+              <a:t>Existing Medical conditions: Diabetes, HBP, Heart diseases</a:t>
+            </a:r>
+          </a:p>
+          <a:p>
+            <a:r>
+              <a:rPr lang="en-GB" sz="1800" dirty="0" smtClean="0"/>
+              <a:t>Vaccination status</a:t>
+            </a:r>
+          </a:p>
+          <a:p>
+            <a:r>
+              <a:rPr lang="en-GB" sz="1800" dirty="0" smtClean="0"/>
+              <a:t>Loss of smell</a:t>
+            </a:r>
+          </a:p>
+          <a:p>
+            <a:r>
+              <a:rPr lang="en-GB" sz="1800" dirty="0" smtClean="0"/>
+              <a:t>Loss of taste</a:t>
+            </a:r>
+          </a:p>
+          <a:p>
+            <a:r>
+              <a:rPr lang="en-GB" sz="1800" dirty="0" smtClean="0"/>
+              <a:t>Fatigue</a:t>
+            </a:r>
+          </a:p>
+          <a:p>
+            <a:r>
+              <a:rPr lang="en-GB" sz="1800" dirty="0" smtClean="0"/>
+              <a:t>Loss of appetite &amp; Difficulty in swallowing food</a:t>
+            </a:r>
+          </a:p>
+          <a:p>
+            <a:r>
+              <a:rPr lang="en-GB" sz="1800" dirty="0" smtClean="0"/>
+              <a:t>Sleep cycle</a:t>
+            </a:r>
+          </a:p>
+          <a:p>
+            <a:r>
+              <a:rPr lang="en-GB" sz="1800" dirty="0" smtClean="0"/>
+              <a:t>Diarrhea</a:t>
+            </a:r>
           </a:p>
         </p:txBody>
       </p:sp>
@@ -11390,7 +11601,7 @@
         </p:nvSpPr>
         <p:spPr>
           <a:xfrm>
-            <a:off x="-1419317" y="686687"/>
+            <a:off x="1859925" y="776217"/>
             <a:ext cx="5424148" cy="501505"/>
           </a:xfrm>
           <a:prstGeom prst="rect">
@@ -11672,7 +11883,7 @@
         </p:nvSpPr>
         <p:spPr>
           <a:xfrm>
-            <a:off x="1988947" y="4506745"/>
+            <a:off x="1594093" y="4445146"/>
             <a:ext cx="5424148" cy="501505"/>
           </a:xfrm>
           <a:prstGeom prst="rect">
@@ -11937,14 +12148,14 @@
           <a:p>
             <a:pPr algn="ctr"/>
             <a:r>
-              <a:rPr lang="en-US" sz="1600" dirty="0" smtClean="0">
+              <a:rPr lang="en-US" dirty="0" smtClean="0">
                 <a:solidFill>
                   <a:schemeClr val="tx1"/>
                 </a:solidFill>
               </a:rPr>
-              <a:t>Training the Neural Network</a:t>
+              <a:t>Other factors affecting user test result</a:t>
             </a:r>
-            <a:endParaRPr lang="en-US" sz="1600" dirty="0">
+            <a:endParaRPr lang="en-US" dirty="0">
               <a:solidFill>
                 <a:schemeClr val="tx1"/>
               </a:solidFill>
@@ -11952,40 +12163,10 @@
           </a:p>
         </p:txBody>
       </p:sp>
-      <p:pic>
-        <p:nvPicPr>
-          <p:cNvPr id="2" name="Picture 1"/>
-          <p:cNvPicPr>
-            <a:picLocks noChangeAspect="1"/>
-          </p:cNvPicPr>
-          <p:nvPr/>
-        </p:nvPicPr>
-        <p:blipFill>
-          <a:blip r:embed="rId3">
-            <a:extLst>
-              <a:ext uri="{28A0092B-C50C-407E-A947-70E740481C1C}">
-                <a14:useLocalDpi xmlns:a14="http://schemas.microsoft.com/office/drawing/2010/main" val="0"/>
-              </a:ext>
-            </a:extLst>
-          </a:blip>
-          <a:stretch>
-            <a:fillRect/>
-          </a:stretch>
-        </p:blipFill>
-        <p:spPr>
-          <a:xfrm>
-            <a:off x="2403039" y="644401"/>
-            <a:ext cx="5525271" cy="3820058"/>
-          </a:xfrm>
-          <a:prstGeom prst="rect">
-            <a:avLst/>
-          </a:prstGeom>
-        </p:spPr>
-      </p:pic>
     </p:spTree>
     <p:extLst>
       <p:ext uri="{BB962C8B-B14F-4D97-AF65-F5344CB8AC3E}">
-        <p14:creationId xmlns:p14="http://schemas.microsoft.com/office/powerpoint/2010/main" val="3502668780"/>
+        <p14:creationId xmlns:p14="http://schemas.microsoft.com/office/powerpoint/2010/main" val="427897798"/>
       </p:ext>
     </p:extLst>
   </p:cSld>
@@ -12652,7 +12833,7 @@
                   <a:schemeClr val="tx1"/>
                 </a:solidFill>
               </a:rPr>
-              <a:t>Sample Classification Result</a:t>
+              <a:t>Training the Neural Network</a:t>
             </a:r>
             <a:endParaRPr lang="en-US" sz="1600" dirty="0">
               <a:solidFill>
@@ -12664,7 +12845,7 @@
       </p:sp>
       <p:pic>
         <p:nvPicPr>
-          <p:cNvPr id="3" name="Picture 2"/>
+          <p:cNvPr id="2" name="Picture 1"/>
           <p:cNvPicPr>
             <a:picLocks noChangeAspect="1"/>
           </p:cNvPicPr>
@@ -12684,8 +12865,8 @@
         </p:blipFill>
         <p:spPr>
           <a:xfrm>
-            <a:off x="3347097" y="930994"/>
-            <a:ext cx="2461422" cy="3289157"/>
+            <a:off x="2403039" y="644401"/>
+            <a:ext cx="5525271" cy="3820058"/>
           </a:xfrm>
           <a:prstGeom prst="rect">
             <a:avLst/>
@@ -12695,18 +12876,18 @@
     </p:spTree>
     <p:extLst>
       <p:ext uri="{BB962C8B-B14F-4D97-AF65-F5344CB8AC3E}">
-        <p14:creationId xmlns:p14="http://schemas.microsoft.com/office/powerpoint/2010/main" val="2242034343"/>
+        <p14:creationId xmlns:p14="http://schemas.microsoft.com/office/powerpoint/2010/main" val="3502668780"/>
       </p:ext>
     </p:extLst>
   </p:cSld>
   <p:clrMapOvr>
     <a:masterClrMapping/>
   </p:clrMapOvr>
-  <mc:AlternateContent xmlns:mc="http://schemas.openxmlformats.org/markup-compatibility/2006">
-    <mc:Choice xmlns:p14="http://schemas.microsoft.com/office/powerpoint/2010/main" Requires="p14">
+  <mc:AlternateContent xmlns:mc="http://schemas.openxmlformats.org/markup-compatibility/2006" xmlns:p14="http://schemas.microsoft.com/office/powerpoint/2010/main">
+    <mc:Choice Requires="p14">
       <p:transition p14:dur="0"/>
     </mc:Choice>
-    <mc:Fallback>
+    <mc:Fallback xmlns="">
       <p:transition/>
     </mc:Fallback>
   </mc:AlternateContent>
@@ -12749,7 +12930,7 @@
         </p:nvSpPr>
         <p:spPr>
           <a:xfrm>
-            <a:off x="395626" y="117620"/>
+            <a:off x="218981" y="142896"/>
             <a:ext cx="7571700" cy="501505"/>
           </a:xfrm>
           <a:prstGeom prst="rect">
@@ -12802,7 +12983,7 @@
       </p:sp>
       <p:sp>
         <p:nvSpPr>
-          <p:cNvPr id="7" name="Google Shape;140;p20"/>
+          <p:cNvPr id="5" name="Google Shape;140;p20"/>
           <p:cNvSpPr txBox="1">
             <a:spLocks/>
           </p:cNvSpPr>
@@ -12810,8 +12991,8 @@
         </p:nvSpPr>
         <p:spPr>
           <a:xfrm>
-            <a:off x="395626" y="862445"/>
-            <a:ext cx="3119099" cy="501505"/>
+            <a:off x="-1419317" y="686687"/>
+            <a:ext cx="5424148" cy="501505"/>
           </a:xfrm>
           <a:prstGeom prst="rect">
             <a:avLst/>
@@ -13073,17 +13254,308 @@
             </a:lvl9pPr>
           </a:lstStyle>
           <a:p>
+            <a:pPr algn="ctr"/>
             <a:r>
               <a:rPr lang="en-US" dirty="0" smtClean="0"/>
-              <a:t>Web Interface</a:t>
+              <a:t>Neural Network</a:t>
             </a:r>
             <a:endParaRPr lang="en-US" dirty="0"/>
           </a:p>
         </p:txBody>
       </p:sp>
+      <p:sp>
+        <p:nvSpPr>
+          <p:cNvPr id="9" name="Google Shape;140;p20"/>
+          <p:cNvSpPr txBox="1">
+            <a:spLocks/>
+          </p:cNvSpPr>
+          <p:nvPr/>
+        </p:nvSpPr>
+        <p:spPr>
+          <a:xfrm>
+            <a:off x="1988947" y="4506745"/>
+            <a:ext cx="5424148" cy="501505"/>
+          </a:xfrm>
+          <a:prstGeom prst="rect">
+            <a:avLst/>
+          </a:prstGeom>
+          <a:noFill/>
+          <a:ln>
+            <a:noFill/>
+          </a:ln>
+        </p:spPr>
+        <p:txBody>
+          <a:bodyPr spcFirstLastPara="1" wrap="square" lIns="91425" tIns="91425" rIns="91425" bIns="91425" anchor="b" anchorCtr="0">
+            <a:noAutofit/>
+          </a:bodyPr>
+          <a:lstStyle>
+            <a:defPPr marR="0" lvl="0" algn="l" rtl="0">
+              <a:lnSpc>
+                <a:spcPct val="100000"/>
+              </a:lnSpc>
+              <a:spcBef>
+                <a:spcPts val="0"/>
+              </a:spcBef>
+              <a:spcAft>
+                <a:spcPts val="0"/>
+              </a:spcAft>
+            </a:defPPr>
+            <a:lvl1pPr marR="0" lvl="0" algn="l" rtl="0">
+              <a:lnSpc>
+                <a:spcPct val="100000"/>
+              </a:lnSpc>
+              <a:spcBef>
+                <a:spcPts val="0"/>
+              </a:spcBef>
+              <a:spcAft>
+                <a:spcPts val="0"/>
+              </a:spcAft>
+              <a:buClr>
+                <a:schemeClr val="accent1"/>
+              </a:buClr>
+              <a:buSzPts val="2000"/>
+              <a:buFont typeface="Roboto Slab"/>
+              <a:buNone/>
+              <a:defRPr sz="2000" b="0" i="0" u="none" strike="noStrike" cap="none">
+                <a:solidFill>
+                  <a:schemeClr val="accent1"/>
+                </a:solidFill>
+                <a:latin typeface="Roboto Slab"/>
+                <a:ea typeface="Roboto Slab"/>
+                <a:cs typeface="Roboto Slab"/>
+                <a:sym typeface="Roboto Slab"/>
+              </a:defRPr>
+            </a:lvl1pPr>
+            <a:lvl2pPr marR="0" lvl="1" algn="l" rtl="0">
+              <a:lnSpc>
+                <a:spcPct val="100000"/>
+              </a:lnSpc>
+              <a:spcBef>
+                <a:spcPts val="0"/>
+              </a:spcBef>
+              <a:spcAft>
+                <a:spcPts val="0"/>
+              </a:spcAft>
+              <a:buClr>
+                <a:schemeClr val="accent1"/>
+              </a:buClr>
+              <a:buSzPts val="2000"/>
+              <a:buFont typeface="Roboto Slab"/>
+              <a:buNone/>
+              <a:defRPr sz="2000" b="0" i="0" u="none" strike="noStrike" cap="none">
+                <a:solidFill>
+                  <a:schemeClr val="accent1"/>
+                </a:solidFill>
+                <a:latin typeface="Roboto Slab"/>
+                <a:ea typeface="Roboto Slab"/>
+                <a:cs typeface="Roboto Slab"/>
+                <a:sym typeface="Roboto Slab"/>
+              </a:defRPr>
+            </a:lvl2pPr>
+            <a:lvl3pPr marR="0" lvl="2" algn="l" rtl="0">
+              <a:lnSpc>
+                <a:spcPct val="100000"/>
+              </a:lnSpc>
+              <a:spcBef>
+                <a:spcPts val="0"/>
+              </a:spcBef>
+              <a:spcAft>
+                <a:spcPts val="0"/>
+              </a:spcAft>
+              <a:buClr>
+                <a:schemeClr val="accent1"/>
+              </a:buClr>
+              <a:buSzPts val="2000"/>
+              <a:buFont typeface="Roboto Slab"/>
+              <a:buNone/>
+              <a:defRPr sz="2000" b="0" i="0" u="none" strike="noStrike" cap="none">
+                <a:solidFill>
+                  <a:schemeClr val="accent1"/>
+                </a:solidFill>
+                <a:latin typeface="Roboto Slab"/>
+                <a:ea typeface="Roboto Slab"/>
+                <a:cs typeface="Roboto Slab"/>
+                <a:sym typeface="Roboto Slab"/>
+              </a:defRPr>
+            </a:lvl3pPr>
+            <a:lvl4pPr marR="0" lvl="3" algn="l" rtl="0">
+              <a:lnSpc>
+                <a:spcPct val="100000"/>
+              </a:lnSpc>
+              <a:spcBef>
+                <a:spcPts val="0"/>
+              </a:spcBef>
+              <a:spcAft>
+                <a:spcPts val="0"/>
+              </a:spcAft>
+              <a:buClr>
+                <a:schemeClr val="accent1"/>
+              </a:buClr>
+              <a:buSzPts val="2000"/>
+              <a:buFont typeface="Roboto Slab"/>
+              <a:buNone/>
+              <a:defRPr sz="2000" b="0" i="0" u="none" strike="noStrike" cap="none">
+                <a:solidFill>
+                  <a:schemeClr val="accent1"/>
+                </a:solidFill>
+                <a:latin typeface="Roboto Slab"/>
+                <a:ea typeface="Roboto Slab"/>
+                <a:cs typeface="Roboto Slab"/>
+                <a:sym typeface="Roboto Slab"/>
+              </a:defRPr>
+            </a:lvl4pPr>
+            <a:lvl5pPr marR="0" lvl="4" algn="l" rtl="0">
+              <a:lnSpc>
+                <a:spcPct val="100000"/>
+              </a:lnSpc>
+              <a:spcBef>
+                <a:spcPts val="0"/>
+              </a:spcBef>
+              <a:spcAft>
+                <a:spcPts val="0"/>
+              </a:spcAft>
+              <a:buClr>
+                <a:schemeClr val="accent1"/>
+              </a:buClr>
+              <a:buSzPts val="2000"/>
+              <a:buFont typeface="Roboto Slab"/>
+              <a:buNone/>
+              <a:defRPr sz="2000" b="0" i="0" u="none" strike="noStrike" cap="none">
+                <a:solidFill>
+                  <a:schemeClr val="accent1"/>
+                </a:solidFill>
+                <a:latin typeface="Roboto Slab"/>
+                <a:ea typeface="Roboto Slab"/>
+                <a:cs typeface="Roboto Slab"/>
+                <a:sym typeface="Roboto Slab"/>
+              </a:defRPr>
+            </a:lvl5pPr>
+            <a:lvl6pPr marR="0" lvl="5" algn="l" rtl="0">
+              <a:lnSpc>
+                <a:spcPct val="100000"/>
+              </a:lnSpc>
+              <a:spcBef>
+                <a:spcPts val="0"/>
+              </a:spcBef>
+              <a:spcAft>
+                <a:spcPts val="0"/>
+              </a:spcAft>
+              <a:buClr>
+                <a:schemeClr val="accent1"/>
+              </a:buClr>
+              <a:buSzPts val="2000"/>
+              <a:buFont typeface="Roboto Slab"/>
+              <a:buNone/>
+              <a:defRPr sz="2000" b="0" i="0" u="none" strike="noStrike" cap="none">
+                <a:solidFill>
+                  <a:schemeClr val="accent1"/>
+                </a:solidFill>
+                <a:latin typeface="Roboto Slab"/>
+                <a:ea typeface="Roboto Slab"/>
+                <a:cs typeface="Roboto Slab"/>
+                <a:sym typeface="Roboto Slab"/>
+              </a:defRPr>
+            </a:lvl6pPr>
+            <a:lvl7pPr marR="0" lvl="6" algn="l" rtl="0">
+              <a:lnSpc>
+                <a:spcPct val="100000"/>
+              </a:lnSpc>
+              <a:spcBef>
+                <a:spcPts val="0"/>
+              </a:spcBef>
+              <a:spcAft>
+                <a:spcPts val="0"/>
+              </a:spcAft>
+              <a:buClr>
+                <a:schemeClr val="accent1"/>
+              </a:buClr>
+              <a:buSzPts val="2000"/>
+              <a:buFont typeface="Roboto Slab"/>
+              <a:buNone/>
+              <a:defRPr sz="2000" b="0" i="0" u="none" strike="noStrike" cap="none">
+                <a:solidFill>
+                  <a:schemeClr val="accent1"/>
+                </a:solidFill>
+                <a:latin typeface="Roboto Slab"/>
+                <a:ea typeface="Roboto Slab"/>
+                <a:cs typeface="Roboto Slab"/>
+                <a:sym typeface="Roboto Slab"/>
+              </a:defRPr>
+            </a:lvl7pPr>
+            <a:lvl8pPr marR="0" lvl="7" algn="l" rtl="0">
+              <a:lnSpc>
+                <a:spcPct val="100000"/>
+              </a:lnSpc>
+              <a:spcBef>
+                <a:spcPts val="0"/>
+              </a:spcBef>
+              <a:spcAft>
+                <a:spcPts val="0"/>
+              </a:spcAft>
+              <a:buClr>
+                <a:schemeClr val="accent1"/>
+              </a:buClr>
+              <a:buSzPts val="2000"/>
+              <a:buFont typeface="Roboto Slab"/>
+              <a:buNone/>
+              <a:defRPr sz="2000" b="0" i="0" u="none" strike="noStrike" cap="none">
+                <a:solidFill>
+                  <a:schemeClr val="accent1"/>
+                </a:solidFill>
+                <a:latin typeface="Roboto Slab"/>
+                <a:ea typeface="Roboto Slab"/>
+                <a:cs typeface="Roboto Slab"/>
+                <a:sym typeface="Roboto Slab"/>
+              </a:defRPr>
+            </a:lvl8pPr>
+            <a:lvl9pPr marR="0" lvl="8" algn="l" rtl="0">
+              <a:lnSpc>
+                <a:spcPct val="100000"/>
+              </a:lnSpc>
+              <a:spcBef>
+                <a:spcPts val="0"/>
+              </a:spcBef>
+              <a:spcAft>
+                <a:spcPts val="0"/>
+              </a:spcAft>
+              <a:buClr>
+                <a:schemeClr val="accent1"/>
+              </a:buClr>
+              <a:buSzPts val="2000"/>
+              <a:buFont typeface="Roboto Slab"/>
+              <a:buNone/>
+              <a:defRPr sz="2000" b="0" i="0" u="none" strike="noStrike" cap="none">
+                <a:solidFill>
+                  <a:schemeClr val="accent1"/>
+                </a:solidFill>
+                <a:latin typeface="Roboto Slab"/>
+                <a:ea typeface="Roboto Slab"/>
+                <a:cs typeface="Roboto Slab"/>
+                <a:sym typeface="Roboto Slab"/>
+              </a:defRPr>
+            </a:lvl9pPr>
+          </a:lstStyle>
+          <a:p>
+            <a:pPr algn="ctr"/>
+            <a:r>
+              <a:rPr lang="en-US" sz="1600" dirty="0" smtClean="0">
+                <a:solidFill>
+                  <a:schemeClr val="tx1"/>
+                </a:solidFill>
+              </a:rPr>
+              <a:t>Sample Classification Result</a:t>
+            </a:r>
+            <a:endParaRPr lang="en-US" sz="1600" dirty="0">
+              <a:solidFill>
+                <a:schemeClr val="tx1"/>
+              </a:solidFill>
+            </a:endParaRPr>
+          </a:p>
+        </p:txBody>
+      </p:sp>
       <p:pic>
         <p:nvPicPr>
-          <p:cNvPr id="2" name="Picture 1"/>
+          <p:cNvPr id="3" name="Picture 2"/>
           <p:cNvPicPr>
             <a:picLocks noChangeAspect="1"/>
           </p:cNvPicPr>
@@ -13103,8 +13575,8 @@
         </p:blipFill>
         <p:spPr>
           <a:xfrm>
-            <a:off x="2456641" y="862445"/>
-            <a:ext cx="6687360" cy="4680330"/>
+            <a:off x="3347097" y="930994"/>
+            <a:ext cx="2461422" cy="3289157"/>
           </a:xfrm>
           <a:prstGeom prst="rect">
             <a:avLst/>
@@ -13114,7 +13586,7 @@
     </p:spTree>
     <p:extLst>
       <p:ext uri="{BB962C8B-B14F-4D97-AF65-F5344CB8AC3E}">
-        <p14:creationId xmlns:p14="http://schemas.microsoft.com/office/powerpoint/2010/main" val="2638510101"/>
+        <p14:creationId xmlns:p14="http://schemas.microsoft.com/office/powerpoint/2010/main" val="2242034343"/>
       </p:ext>
     </p:extLst>
   </p:cSld>
@@ -13502,7 +13974,7 @@
       </p:sp>
       <p:pic>
         <p:nvPicPr>
-          <p:cNvPr id="3" name="Picture 2"/>
+          <p:cNvPr id="2" name="Picture 1"/>
           <p:cNvPicPr>
             <a:picLocks noChangeAspect="1"/>
           </p:cNvPicPr>
@@ -13522,29 +13994,57 @@
         </p:blipFill>
         <p:spPr>
           <a:xfrm>
-            <a:off x="3283239" y="619125"/>
-            <a:ext cx="5669846" cy="4447309"/>
+            <a:off x="2456641" y="862445"/>
+            <a:ext cx="6687360" cy="4680330"/>
           </a:xfrm>
           <a:prstGeom prst="rect">
             <a:avLst/>
           </a:prstGeom>
         </p:spPr>
       </p:pic>
+      <p:sp>
+        <p:nvSpPr>
+          <p:cNvPr id="3" name="Rectangle 2"/>
+          <p:cNvSpPr/>
+          <p:nvPr/>
+        </p:nvSpPr>
+        <p:spPr>
+          <a:xfrm>
+            <a:off x="395626" y="1363950"/>
+            <a:ext cx="2403222" cy="307777"/>
+          </a:xfrm>
+          <a:prstGeom prst="rect">
+            <a:avLst/>
+          </a:prstGeom>
+        </p:spPr>
+        <p:txBody>
+          <a:bodyPr wrap="none">
+            <a:spAutoFit/>
+          </a:bodyPr>
+          <a:lstStyle/>
+          <a:p>
+            <a:r>
+              <a:rPr lang="en-GB" dirty="0"/>
+              <a:t>https://copodtwo.netlify.app/</a:t>
+            </a:r>
+          </a:p>
+        </p:txBody>
+      </p:sp>
     </p:spTree>
     <p:extLst>
       <p:ext uri="{BB962C8B-B14F-4D97-AF65-F5344CB8AC3E}">
-        <p14:creationId xmlns:p14="http://schemas.microsoft.com/office/powerpoint/2010/main" val="2554319343"/>
+        <p14:creationId xmlns:p14="http://schemas.microsoft.com/office/powerpoint/2010/main" val="2638510101"/>
       </p:ext>
     </p:extLst>
   </p:cSld>
   <p:clrMapOvr>
     <a:masterClrMapping/>
   </p:clrMapOvr>
-  <mc:AlternateContent xmlns:mc="http://schemas.openxmlformats.org/markup-compatibility/2006">
-    <mc:Choice xmlns:p14="http://schemas.microsoft.com/office/powerpoint/2010/main" Requires="p14">
+  <mc:AlternateContent xmlns:mc="http://schemas.openxmlformats.org/markup-compatibility/2006" xmlns:p14="http://schemas.microsoft.com/office/powerpoint/2010/main">
+    <mc:Choice Requires="p14">
       <p:transition p14:dur="0"/>
     </mc:Choice>
-    <mc:Fallback>
+    <mc:Fallback xmlns="">
       <p:transition/>
     </mc:Fallback>
   </mc:AlternateContent>
@@ -14261,6 +14761,453 @@
       </p:sp>
       <p:pic>
         <p:nvPicPr>
+          <p:cNvPr id="3" name="Picture 2"/>
+          <p:cNvPicPr>
+            <a:picLocks noChangeAspect="1"/>
+          </p:cNvPicPr>
+          <p:nvPr/>
+        </p:nvPicPr>
+        <p:blipFill>
+          <a:blip r:embed="rId3">
+            <a:extLst>
+              <a:ext uri="{28A0092B-C50C-407E-A947-70E740481C1C}">
+                <a14:useLocalDpi xmlns:a14="http://schemas.microsoft.com/office/drawing/2010/main" val="0"/>
+              </a:ext>
+            </a:extLst>
+          </a:blip>
+          <a:stretch>
+            <a:fillRect/>
+          </a:stretch>
+        </p:blipFill>
+        <p:spPr>
+          <a:xfrm>
+            <a:off x="3283239" y="619125"/>
+            <a:ext cx="5669846" cy="4447309"/>
+          </a:xfrm>
+          <a:prstGeom prst="rect">
+            <a:avLst/>
+          </a:prstGeom>
+        </p:spPr>
+      </p:pic>
+      <p:sp>
+        <p:nvSpPr>
+          <p:cNvPr id="2" name="Rectangle 1"/>
+          <p:cNvSpPr/>
+          <p:nvPr/>
+        </p:nvSpPr>
+        <p:spPr>
+          <a:xfrm>
+            <a:off x="395626" y="1363950"/>
+            <a:ext cx="2403222" cy="307777"/>
+          </a:xfrm>
+          <a:prstGeom prst="rect">
+            <a:avLst/>
+          </a:prstGeom>
+        </p:spPr>
+        <p:txBody>
+          <a:bodyPr wrap="none">
+            <a:spAutoFit/>
+          </a:bodyPr>
+          <a:lstStyle/>
+          <a:p>
+            <a:r>
+              <a:rPr lang="en-GB" dirty="0"/>
+              <a:t>https://copodtwo.netlify.app/</a:t>
+            </a:r>
+          </a:p>
+        </p:txBody>
+      </p:sp>
+    </p:spTree>
+    <p:extLst>
+      <p:ext uri="{BB962C8B-B14F-4D97-AF65-F5344CB8AC3E}">
+        <p14:creationId xmlns:p14="http://schemas.microsoft.com/office/powerpoint/2010/main" val="2554319343"/>
+      </p:ext>
+    </p:extLst>
+  </p:cSld>
+  <p:clrMapOvr>
+    <a:masterClrMapping/>
+  </p:clrMapOvr>
+  <mc:AlternateContent xmlns:mc="http://schemas.openxmlformats.org/markup-compatibility/2006" xmlns:p14="http://schemas.microsoft.com/office/powerpoint/2010/main">
+    <mc:Choice Requires="p14">
+      <p:transition p14:dur="0"/>
+    </mc:Choice>
+    <mc:Fallback xmlns="">
+      <p:transition/>
+    </mc:Fallback>
+  </mc:AlternateContent>
+  <p:timing>
+    <p:tnLst>
+      <p:par>
+        <p:cTn id="1" dur="indefinite" restart="never" nodeType="tmRoot"/>
+      </p:par>
+    </p:tnLst>
+  </p:timing>
+</p:sld>
+</file>
+
+<file path=ppt/slides/slide21.xml><?xml version="1.0" encoding="utf-8"?>
+<p:sld xmlns:a="http://schemas.openxmlformats.org/drawingml/2006/main" xmlns:r="http://schemas.openxmlformats.org/officeDocument/2006/relationships" xmlns:p="http://schemas.openxmlformats.org/presentationml/2006/main">
+  <p:cSld>
+    <p:spTree>
+      <p:nvGrpSpPr>
+        <p:cNvPr id="1" name="Shape 139"/>
+        <p:cNvGrpSpPr/>
+        <p:nvPr/>
+      </p:nvGrpSpPr>
+      <p:grpSpPr>
+        <a:xfrm>
+          <a:off x="0" y="0"/>
+          <a:ext cx="0" cy="0"/>
+          <a:chOff x="0" y="0"/>
+          <a:chExt cx="0" cy="0"/>
+        </a:xfrm>
+      </p:grpSpPr>
+      <p:sp>
+        <p:nvSpPr>
+          <p:cNvPr id="140" name="Google Shape;140;p20"/>
+          <p:cNvSpPr txBox="1">
+            <a:spLocks noGrp="1"/>
+          </p:cNvSpPr>
+          <p:nvPr>
+            <p:ph type="title"/>
+          </p:nvPr>
+        </p:nvSpPr>
+        <p:spPr>
+          <a:xfrm>
+            <a:off x="395626" y="117620"/>
+            <a:ext cx="7571700" cy="501505"/>
+          </a:xfrm>
+          <a:prstGeom prst="rect">
+            <a:avLst/>
+          </a:prstGeom>
+        </p:spPr>
+        <p:txBody>
+          <a:bodyPr spcFirstLastPara="1" wrap="square" lIns="91425" tIns="91425" rIns="91425" bIns="91425" anchor="b" anchorCtr="0">
+            <a:noAutofit/>
+          </a:bodyPr>
+          <a:lstStyle/>
+          <a:p>
+            <a:r>
+              <a:rPr lang="en-US" sz="2400" dirty="0" smtClean="0"/>
+              <a:t>IMPLEMENTATION</a:t>
+            </a:r>
+            <a:endParaRPr sz="2400" dirty="0"/>
+          </a:p>
+        </p:txBody>
+      </p:sp>
+      <p:sp>
+        <p:nvSpPr>
+          <p:cNvPr id="144" name="Google Shape;144;p20"/>
+          <p:cNvSpPr txBox="1">
+            <a:spLocks noGrp="1"/>
+          </p:cNvSpPr>
+          <p:nvPr>
+            <p:ph type="sldNum" idx="12"/>
+          </p:nvPr>
+        </p:nvSpPr>
+        <p:spPr>
+          <a:prstGeom prst="rect">
+            <a:avLst/>
+          </a:prstGeom>
+        </p:spPr>
+        <p:txBody>
+          <a:bodyPr spcFirstLastPara="1" wrap="square" lIns="91425" tIns="91425" rIns="91425" bIns="91425" anchor="t" anchorCtr="0">
+            <a:noAutofit/>
+          </a:bodyPr>
+          <a:lstStyle/>
+          <a:p>
+            <a:fld id="{00000000-1234-1234-1234-123412341234}" type="slidenum">
+              <a:rPr lang="en"/>
+              <a:pPr/>
+              <a:t>21</a:t>
+            </a:fld>
+            <a:endParaRPr dirty="0"/>
+          </a:p>
+        </p:txBody>
+      </p:sp>
+      <p:sp>
+        <p:nvSpPr>
+          <p:cNvPr id="7" name="Google Shape;140;p20"/>
+          <p:cNvSpPr txBox="1">
+            <a:spLocks/>
+          </p:cNvSpPr>
+          <p:nvPr/>
+        </p:nvSpPr>
+        <p:spPr>
+          <a:xfrm>
+            <a:off x="395626" y="862445"/>
+            <a:ext cx="3119099" cy="501505"/>
+          </a:xfrm>
+          <a:prstGeom prst="rect">
+            <a:avLst/>
+          </a:prstGeom>
+          <a:noFill/>
+          <a:ln>
+            <a:noFill/>
+          </a:ln>
+        </p:spPr>
+        <p:txBody>
+          <a:bodyPr spcFirstLastPara="1" wrap="square" lIns="91425" tIns="91425" rIns="91425" bIns="91425" anchor="b" anchorCtr="0">
+            <a:noAutofit/>
+          </a:bodyPr>
+          <a:lstStyle>
+            <a:defPPr marR="0" lvl="0" algn="l" rtl="0">
+              <a:lnSpc>
+                <a:spcPct val="100000"/>
+              </a:lnSpc>
+              <a:spcBef>
+                <a:spcPts val="0"/>
+              </a:spcBef>
+              <a:spcAft>
+                <a:spcPts val="0"/>
+              </a:spcAft>
+            </a:defPPr>
+            <a:lvl1pPr marR="0" lvl="0" algn="l" rtl="0">
+              <a:lnSpc>
+                <a:spcPct val="100000"/>
+              </a:lnSpc>
+              <a:spcBef>
+                <a:spcPts val="0"/>
+              </a:spcBef>
+              <a:spcAft>
+                <a:spcPts val="0"/>
+              </a:spcAft>
+              <a:buClr>
+                <a:schemeClr val="accent1"/>
+              </a:buClr>
+              <a:buSzPts val="2000"/>
+              <a:buFont typeface="Roboto Slab"/>
+              <a:buNone/>
+              <a:defRPr sz="2000" b="0" i="0" u="none" strike="noStrike" cap="none">
+                <a:solidFill>
+                  <a:schemeClr val="accent1"/>
+                </a:solidFill>
+                <a:latin typeface="Roboto Slab"/>
+                <a:ea typeface="Roboto Slab"/>
+                <a:cs typeface="Roboto Slab"/>
+                <a:sym typeface="Roboto Slab"/>
+              </a:defRPr>
+            </a:lvl1pPr>
+            <a:lvl2pPr marR="0" lvl="1" algn="l" rtl="0">
+              <a:lnSpc>
+                <a:spcPct val="100000"/>
+              </a:lnSpc>
+              <a:spcBef>
+                <a:spcPts val="0"/>
+              </a:spcBef>
+              <a:spcAft>
+                <a:spcPts val="0"/>
+              </a:spcAft>
+              <a:buClr>
+                <a:schemeClr val="accent1"/>
+              </a:buClr>
+              <a:buSzPts val="2000"/>
+              <a:buFont typeface="Roboto Slab"/>
+              <a:buNone/>
+              <a:defRPr sz="2000" b="0" i="0" u="none" strike="noStrike" cap="none">
+                <a:solidFill>
+                  <a:schemeClr val="accent1"/>
+                </a:solidFill>
+                <a:latin typeface="Roboto Slab"/>
+                <a:ea typeface="Roboto Slab"/>
+                <a:cs typeface="Roboto Slab"/>
+                <a:sym typeface="Roboto Slab"/>
+              </a:defRPr>
+            </a:lvl2pPr>
+            <a:lvl3pPr marR="0" lvl="2" algn="l" rtl="0">
+              <a:lnSpc>
+                <a:spcPct val="100000"/>
+              </a:lnSpc>
+              <a:spcBef>
+                <a:spcPts val="0"/>
+              </a:spcBef>
+              <a:spcAft>
+                <a:spcPts val="0"/>
+              </a:spcAft>
+              <a:buClr>
+                <a:schemeClr val="accent1"/>
+              </a:buClr>
+              <a:buSzPts val="2000"/>
+              <a:buFont typeface="Roboto Slab"/>
+              <a:buNone/>
+              <a:defRPr sz="2000" b="0" i="0" u="none" strike="noStrike" cap="none">
+                <a:solidFill>
+                  <a:schemeClr val="accent1"/>
+                </a:solidFill>
+                <a:latin typeface="Roboto Slab"/>
+                <a:ea typeface="Roboto Slab"/>
+                <a:cs typeface="Roboto Slab"/>
+                <a:sym typeface="Roboto Slab"/>
+              </a:defRPr>
+            </a:lvl3pPr>
+            <a:lvl4pPr marR="0" lvl="3" algn="l" rtl="0">
+              <a:lnSpc>
+                <a:spcPct val="100000"/>
+              </a:lnSpc>
+              <a:spcBef>
+                <a:spcPts val="0"/>
+              </a:spcBef>
+              <a:spcAft>
+                <a:spcPts val="0"/>
+              </a:spcAft>
+              <a:buClr>
+                <a:schemeClr val="accent1"/>
+              </a:buClr>
+              <a:buSzPts val="2000"/>
+              <a:buFont typeface="Roboto Slab"/>
+              <a:buNone/>
+              <a:defRPr sz="2000" b="0" i="0" u="none" strike="noStrike" cap="none">
+                <a:solidFill>
+                  <a:schemeClr val="accent1"/>
+                </a:solidFill>
+                <a:latin typeface="Roboto Slab"/>
+                <a:ea typeface="Roboto Slab"/>
+                <a:cs typeface="Roboto Slab"/>
+                <a:sym typeface="Roboto Slab"/>
+              </a:defRPr>
+            </a:lvl4pPr>
+            <a:lvl5pPr marR="0" lvl="4" algn="l" rtl="0">
+              <a:lnSpc>
+                <a:spcPct val="100000"/>
+              </a:lnSpc>
+              <a:spcBef>
+                <a:spcPts val="0"/>
+              </a:spcBef>
+              <a:spcAft>
+                <a:spcPts val="0"/>
+              </a:spcAft>
+              <a:buClr>
+                <a:schemeClr val="accent1"/>
+              </a:buClr>
+              <a:buSzPts val="2000"/>
+              <a:buFont typeface="Roboto Slab"/>
+              <a:buNone/>
+              <a:defRPr sz="2000" b="0" i="0" u="none" strike="noStrike" cap="none">
+                <a:solidFill>
+                  <a:schemeClr val="accent1"/>
+                </a:solidFill>
+                <a:latin typeface="Roboto Slab"/>
+                <a:ea typeface="Roboto Slab"/>
+                <a:cs typeface="Roboto Slab"/>
+                <a:sym typeface="Roboto Slab"/>
+              </a:defRPr>
+            </a:lvl5pPr>
+            <a:lvl6pPr marR="0" lvl="5" algn="l" rtl="0">
+              <a:lnSpc>
+                <a:spcPct val="100000"/>
+              </a:lnSpc>
+              <a:spcBef>
+                <a:spcPts val="0"/>
+              </a:spcBef>
+              <a:spcAft>
+                <a:spcPts val="0"/>
+              </a:spcAft>
+              <a:buClr>
+                <a:schemeClr val="accent1"/>
+              </a:buClr>
+              <a:buSzPts val="2000"/>
+              <a:buFont typeface="Roboto Slab"/>
+              <a:buNone/>
+              <a:defRPr sz="2000" b="0" i="0" u="none" strike="noStrike" cap="none">
+                <a:solidFill>
+                  <a:schemeClr val="accent1"/>
+                </a:solidFill>
+                <a:latin typeface="Roboto Slab"/>
+                <a:ea typeface="Roboto Slab"/>
+                <a:cs typeface="Roboto Slab"/>
+                <a:sym typeface="Roboto Slab"/>
+              </a:defRPr>
+            </a:lvl6pPr>
+            <a:lvl7pPr marR="0" lvl="6" algn="l" rtl="0">
+              <a:lnSpc>
+                <a:spcPct val="100000"/>
+              </a:lnSpc>
+              <a:spcBef>
+                <a:spcPts val="0"/>
+              </a:spcBef>
+              <a:spcAft>
+                <a:spcPts val="0"/>
+              </a:spcAft>
+              <a:buClr>
+                <a:schemeClr val="accent1"/>
+              </a:buClr>
+              <a:buSzPts val="2000"/>
+              <a:buFont typeface="Roboto Slab"/>
+              <a:buNone/>
+              <a:defRPr sz="2000" b="0" i="0" u="none" strike="noStrike" cap="none">
+                <a:solidFill>
+                  <a:schemeClr val="accent1"/>
+                </a:solidFill>
+                <a:latin typeface="Roboto Slab"/>
+                <a:ea typeface="Roboto Slab"/>
+                <a:cs typeface="Roboto Slab"/>
+                <a:sym typeface="Roboto Slab"/>
+              </a:defRPr>
+            </a:lvl7pPr>
+            <a:lvl8pPr marR="0" lvl="7" algn="l" rtl="0">
+              <a:lnSpc>
+                <a:spcPct val="100000"/>
+              </a:lnSpc>
+              <a:spcBef>
+                <a:spcPts val="0"/>
+              </a:spcBef>
+              <a:spcAft>
+                <a:spcPts val="0"/>
+              </a:spcAft>
+              <a:buClr>
+                <a:schemeClr val="accent1"/>
+              </a:buClr>
+              <a:buSzPts val="2000"/>
+              <a:buFont typeface="Roboto Slab"/>
+              <a:buNone/>
+              <a:defRPr sz="2000" b="0" i="0" u="none" strike="noStrike" cap="none">
+                <a:solidFill>
+                  <a:schemeClr val="accent1"/>
+                </a:solidFill>
+                <a:latin typeface="Roboto Slab"/>
+                <a:ea typeface="Roboto Slab"/>
+                <a:cs typeface="Roboto Slab"/>
+                <a:sym typeface="Roboto Slab"/>
+              </a:defRPr>
+            </a:lvl8pPr>
+            <a:lvl9pPr marR="0" lvl="8" algn="l" rtl="0">
+              <a:lnSpc>
+                <a:spcPct val="100000"/>
+              </a:lnSpc>
+              <a:spcBef>
+                <a:spcPts val="0"/>
+              </a:spcBef>
+              <a:spcAft>
+                <a:spcPts val="0"/>
+              </a:spcAft>
+              <a:buClr>
+                <a:schemeClr val="accent1"/>
+              </a:buClr>
+              <a:buSzPts val="2000"/>
+              <a:buFont typeface="Roboto Slab"/>
+              <a:buNone/>
+              <a:defRPr sz="2000" b="0" i="0" u="none" strike="noStrike" cap="none">
+                <a:solidFill>
+                  <a:schemeClr val="accent1"/>
+                </a:solidFill>
+                <a:latin typeface="Roboto Slab"/>
+                <a:ea typeface="Roboto Slab"/>
+                <a:cs typeface="Roboto Slab"/>
+                <a:sym typeface="Roboto Slab"/>
+              </a:defRPr>
+            </a:lvl9pPr>
+          </a:lstStyle>
+          <a:p>
+            <a:r>
+              <a:rPr lang="en-US" dirty="0" smtClean="0"/>
+              <a:t>Web Interface</a:t>
+            </a:r>
+            <a:endParaRPr lang="en-US" dirty="0"/>
+          </a:p>
+        </p:txBody>
+      </p:sp>
+      <p:pic>
+        <p:nvPicPr>
           <p:cNvPr id="2" name="Picture 1"/>
           <p:cNvPicPr>
             <a:picLocks noChangeAspect="1"/>
@@ -14289,6 +15236,34 @@
           </a:prstGeom>
         </p:spPr>
       </p:pic>
+      <p:sp>
+        <p:nvSpPr>
+          <p:cNvPr id="3" name="Rectangle 2"/>
+          <p:cNvSpPr/>
+          <p:nvPr/>
+        </p:nvSpPr>
+        <p:spPr>
+          <a:xfrm>
+            <a:off x="395626" y="1363950"/>
+            <a:ext cx="2403222" cy="307777"/>
+          </a:xfrm>
+          <a:prstGeom prst="rect">
+            <a:avLst/>
+          </a:prstGeom>
+        </p:spPr>
+        <p:txBody>
+          <a:bodyPr wrap="none">
+            <a:spAutoFit/>
+          </a:bodyPr>
+          <a:lstStyle/>
+          <a:p>
+            <a:r>
+              <a:rPr lang="en-GB" dirty="0"/>
+              <a:t>https://copodtwo.netlify.app/</a:t>
+            </a:r>
+          </a:p>
+        </p:txBody>
+      </p:sp>
     </p:spTree>
     <p:extLst>
       <p:ext uri="{BB962C8B-B14F-4D97-AF65-F5344CB8AC3E}">
@@ -14299,11 +15274,11 @@
   <p:clrMapOvr>
     <a:masterClrMapping/>
   </p:clrMapOvr>
-  <mc:AlternateContent xmlns:mc="http://schemas.openxmlformats.org/markup-compatibility/2006">
-    <mc:Choice xmlns:p14="http://schemas.microsoft.com/office/powerpoint/2010/main" Requires="p14">
+  <mc:AlternateContent xmlns:mc="http://schemas.openxmlformats.org/markup-compatibility/2006" xmlns:p14="http://schemas.microsoft.com/office/powerpoint/2010/main">
+    <mc:Choice Requires="p14">
       <p:transition p14:dur="0"/>
     </mc:Choice>
-    <mc:Fallback>
+    <mc:Fallback xmlns="">
       <p:transition/>
     </mc:Fallback>
   </mc:AlternateContent>
@@ -14317,7 +15292,7 @@
 </p:sld>
 </file>
 
-<file path=ppt/slides/slide21.xml><?xml version="1.0" encoding="utf-8"?>
+<file path=ppt/slides/slide22.xml><?xml version="1.0" encoding="utf-8"?>
 <p:sld xmlns:a="http://schemas.openxmlformats.org/drawingml/2006/main" xmlns:r="http://schemas.openxmlformats.org/officeDocument/2006/relationships" xmlns:p="http://schemas.openxmlformats.org/presentationml/2006/main">
   <p:cSld>
     <p:spTree>
@@ -14392,7 +15367,7 @@
             <a:fld id="{00000000-1234-1234-1234-123412341234}" type="slidenum">
               <a:rPr lang="en"/>
               <a:pPr/>
-              <a:t>21</a:t>
+              <a:t>22</a:t>
             </a:fld>
             <a:endParaRPr dirty="0"/>
           </a:p>
@@ -14717,11 +15692,11 @@
   <p:clrMapOvr>
     <a:masterClrMapping/>
   </p:clrMapOvr>
-  <mc:AlternateContent xmlns:mc="http://schemas.openxmlformats.org/markup-compatibility/2006">
-    <mc:Choice xmlns:p14="http://schemas.microsoft.com/office/powerpoint/2010/main" Requires="p14">
+  <mc:AlternateContent xmlns:mc="http://schemas.openxmlformats.org/markup-compatibility/2006" xmlns:p14="http://schemas.microsoft.com/office/powerpoint/2010/main">
+    <mc:Choice Requires="p14">
       <p:transition p14:dur="0"/>
     </mc:Choice>
-    <mc:Fallback>
+    <mc:Fallback xmlns="">
       <p:transition/>
     </mc:Fallback>
   </mc:AlternateContent>
@@ -14735,7 +15710,7 @@
 </p:sld>
 </file>
 
-<file path=ppt/slides/slide22.xml><?xml version="1.0" encoding="utf-8"?>
+<file path=ppt/slides/slide23.xml><?xml version="1.0" encoding="utf-8"?>
 <p:sld xmlns:a="http://schemas.openxmlformats.org/drawingml/2006/main" xmlns:r="http://schemas.openxmlformats.org/officeDocument/2006/relationships" xmlns:p="http://schemas.openxmlformats.org/presentationml/2006/main">
   <p:cSld>
     <p:spTree>
@@ -14874,7 +15849,7 @@
 </p:sld>
 </file>
 
-<file path=ppt/slides/slide23.xml><?xml version="1.0" encoding="utf-8"?>
+<file path=ppt/slides/slide24.xml><?xml version="1.0" encoding="utf-8"?>
 <p:sld xmlns:a="http://schemas.openxmlformats.org/drawingml/2006/main" xmlns:r="http://schemas.openxmlformats.org/officeDocument/2006/relationships" xmlns:p="http://schemas.openxmlformats.org/presentationml/2006/main">
   <p:cSld>
     <p:spTree>
@@ -15007,7 +15982,7 @@
 </p:sld>
 </file>
 
-<file path=ppt/slides/slide24.xml><?xml version="1.0" encoding="utf-8"?>
+<file path=ppt/slides/slide25.xml><?xml version="1.0" encoding="utf-8"?>
 <p:sld xmlns:a="http://schemas.openxmlformats.org/drawingml/2006/main" xmlns:r="http://schemas.openxmlformats.org/officeDocument/2006/relationships" xmlns:p="http://schemas.openxmlformats.org/presentationml/2006/main">
   <p:cSld>
     <p:spTree>
@@ -15165,11 +16140,11 @@
   <p:clrMapOvr>
     <a:masterClrMapping/>
   </p:clrMapOvr>
-  <mc:AlternateContent xmlns:mc="http://schemas.openxmlformats.org/markup-compatibility/2006">
-    <mc:Choice xmlns:p14="http://schemas.microsoft.com/office/powerpoint/2010/main" Requires="p14">
+  <mc:AlternateContent xmlns:mc="http://schemas.openxmlformats.org/markup-compatibility/2006" xmlns:p14="http://schemas.microsoft.com/office/powerpoint/2010/main">
+    <mc:Choice Requires="p14">
       <p:transition p14:dur="0"/>
     </mc:Choice>
-    <mc:Fallback>
+    <mc:Fallback xmlns="">
       <p:transition/>
     </mc:Fallback>
   </mc:AlternateContent>
@@ -15183,7 +16158,7 @@
 </p:sld>
 </file>
 
-<file path=ppt/slides/slide25.xml><?xml version="1.0" encoding="utf-8"?>
+<file path=ppt/slides/slide26.xml><?xml version="1.0" encoding="utf-8"?>
 <p:sld xmlns:a="http://schemas.openxmlformats.org/drawingml/2006/main" xmlns:r="http://schemas.openxmlformats.org/officeDocument/2006/relationships" xmlns:p="http://schemas.openxmlformats.org/presentationml/2006/main">
   <p:cSld>
     <p:spTree>
@@ -15357,11 +16332,11 @@
   <p:clrMapOvr>
     <a:masterClrMapping/>
   </p:clrMapOvr>
-  <mc:AlternateContent xmlns:mc="http://schemas.openxmlformats.org/markup-compatibility/2006">
-    <mc:Choice xmlns:p14="http://schemas.microsoft.com/office/powerpoint/2010/main" Requires="p14">
+  <mc:AlternateContent xmlns:mc="http://schemas.openxmlformats.org/markup-compatibility/2006" xmlns:p14="http://schemas.microsoft.com/office/powerpoint/2010/main">
+    <mc:Choice Requires="p14">
       <p:transition p14:dur="0"/>
     </mc:Choice>
-    <mc:Fallback>
+    <mc:Fallback xmlns="">
       <p:transition/>
     </mc:Fallback>
   </mc:AlternateContent>
@@ -15375,7 +16350,7 @@
 </p:sld>
 </file>
 
-<file path=ppt/slides/slide26.xml><?xml version="1.0" encoding="utf-8"?>
+<file path=ppt/slides/slide27.xml><?xml version="1.0" encoding="utf-8"?>
 <p:sld xmlns:a="http://schemas.openxmlformats.org/drawingml/2006/main" xmlns:r="http://schemas.openxmlformats.org/officeDocument/2006/relationships" xmlns:p="http://schemas.openxmlformats.org/presentationml/2006/main">
   <p:cSld>
     <p:spTree>
@@ -15746,7 +16721,7 @@
             <a:fld id="{00000000-1234-1234-1234-123412341234}" type="slidenum">
               <a:rPr lang="en"/>
               <a:pPr/>
-              <a:t>26</a:t>
+              <a:t>27</a:t>
             </a:fld>
             <a:endParaRPr dirty="0"/>
           </a:p>
@@ -16247,15 +17222,7 @@
                   <a:schemeClr val="accent2"/>
                 </a:solidFill>
               </a:rPr>
-              <a:t>Sara </a:t>
-            </a:r>
-            <a:r>
-              <a:rPr lang="en-US" sz="1800" dirty="0">
-                <a:solidFill>
-                  <a:schemeClr val="accent2"/>
-                </a:solidFill>
-              </a:rPr>
-              <a:t>Brown, 2021)</a:t>
+              <a:t>Sara Brown, 2021)</a:t>
             </a:r>
           </a:p>
           <a:p>
@@ -16984,7 +17951,23 @@
                   <a:schemeClr val="accent2"/>
                 </a:solidFill>
               </a:rPr>
-              <a:t>The standard test for diagnosing COVID-19 in a patient is the PCR test: Reverse Transcriptase-Polymerase Chain Reaction (Fegert et al, 2020)</a:t>
+              <a:t>The standard test for diagnosing COVID-19 in a patient is the </a:t>
+            </a:r>
+            <a:r>
+              <a:rPr lang="en-US" sz="1800" dirty="0" smtClean="0">
+                <a:solidFill>
+                  <a:schemeClr val="accent2"/>
+                </a:solidFill>
+              </a:rPr>
+              <a:t>RT-PCR </a:t>
+            </a:r>
+            <a:r>
+              <a:rPr lang="en-US" sz="1800" dirty="0">
+                <a:solidFill>
+                  <a:schemeClr val="accent2"/>
+                </a:solidFill>
+              </a:rPr>
+              <a:t>test: Reverse Transcriptase-Polymerase Chain Reaction (Fegert et al, 2020)</a:t>
             </a:r>
           </a:p>
           <a:p>

</xml_diff>